<commit_message>
Aggiornata bozza con schema di riferimento ad app simili
</commit_message>
<xml_diff>
--- a/bozza app.pptx
+++ b/bozza app.pptx
@@ -6,6 +6,7 @@
   </p:sldMasterIdLst>
   <p:sldIdLst>
     <p:sldId id="256" r:id="rId2"/>
+    <p:sldId id="258" r:id="rId3"/>
   </p:sldIdLst>
   <p:sldSz cx="12192000" cy="6858000"/>
   <p:notesSz cx="6858000" cy="9144000"/>
@@ -104,6 +105,11 @@
       </a:defRPr>
     </a:lvl9pPr>
   </p:defaultTextStyle>
+  <p:extLst>
+    <p:ext uri="{EFAFB233-063F-42B5-8137-9DF3F51BA10A}">
+      <p15:sldGuideLst xmlns:p15="http://schemas.microsoft.com/office/powerpoint/2012/main"/>
+    </p:ext>
+  </p:extLst>
 </p:presentation>
 </file>
 
@@ -238,7 +244,7 @@
           <a:p>
             <a:fld id="{081E6A33-EDA1-4F1D-B7F2-06C3686F4363}" type="datetimeFigureOut">
               <a:rPr lang="it-IT" smtClean="0"/>
-              <a:t>10/04/2018</a:t>
+              <a:t>14/04/2018</a:t>
             </a:fld>
             <a:endParaRPr lang="it-IT"/>
           </a:p>
@@ -408,7 +414,7 @@
           <a:p>
             <a:fld id="{081E6A33-EDA1-4F1D-B7F2-06C3686F4363}" type="datetimeFigureOut">
               <a:rPr lang="it-IT" smtClean="0"/>
-              <a:t>10/04/2018</a:t>
+              <a:t>14/04/2018</a:t>
             </a:fld>
             <a:endParaRPr lang="it-IT"/>
           </a:p>
@@ -588,7 +594,7 @@
           <a:p>
             <a:fld id="{081E6A33-EDA1-4F1D-B7F2-06C3686F4363}" type="datetimeFigureOut">
               <a:rPr lang="it-IT" smtClean="0"/>
-              <a:t>10/04/2018</a:t>
+              <a:t>14/04/2018</a:t>
             </a:fld>
             <a:endParaRPr lang="it-IT"/>
           </a:p>
@@ -758,7 +764,7 @@
           <a:p>
             <a:fld id="{081E6A33-EDA1-4F1D-B7F2-06C3686F4363}" type="datetimeFigureOut">
               <a:rPr lang="it-IT" smtClean="0"/>
-              <a:t>10/04/2018</a:t>
+              <a:t>14/04/2018</a:t>
             </a:fld>
             <a:endParaRPr lang="it-IT"/>
           </a:p>
@@ -1004,7 +1010,7 @@
           <a:p>
             <a:fld id="{081E6A33-EDA1-4F1D-B7F2-06C3686F4363}" type="datetimeFigureOut">
               <a:rPr lang="it-IT" smtClean="0"/>
-              <a:t>10/04/2018</a:t>
+              <a:t>14/04/2018</a:t>
             </a:fld>
             <a:endParaRPr lang="it-IT"/>
           </a:p>
@@ -1236,7 +1242,7 @@
           <a:p>
             <a:fld id="{081E6A33-EDA1-4F1D-B7F2-06C3686F4363}" type="datetimeFigureOut">
               <a:rPr lang="it-IT" smtClean="0"/>
-              <a:t>10/04/2018</a:t>
+              <a:t>14/04/2018</a:t>
             </a:fld>
             <a:endParaRPr lang="it-IT"/>
           </a:p>
@@ -1603,7 +1609,7 @@
           <a:p>
             <a:fld id="{081E6A33-EDA1-4F1D-B7F2-06C3686F4363}" type="datetimeFigureOut">
               <a:rPr lang="it-IT" smtClean="0"/>
-              <a:t>10/04/2018</a:t>
+              <a:t>14/04/2018</a:t>
             </a:fld>
             <a:endParaRPr lang="it-IT"/>
           </a:p>
@@ -1721,7 +1727,7 @@
           <a:p>
             <a:fld id="{081E6A33-EDA1-4F1D-B7F2-06C3686F4363}" type="datetimeFigureOut">
               <a:rPr lang="it-IT" smtClean="0"/>
-              <a:t>10/04/2018</a:t>
+              <a:t>14/04/2018</a:t>
             </a:fld>
             <a:endParaRPr lang="it-IT"/>
           </a:p>
@@ -1816,7 +1822,7 @@
           <a:p>
             <a:fld id="{081E6A33-EDA1-4F1D-B7F2-06C3686F4363}" type="datetimeFigureOut">
               <a:rPr lang="it-IT" smtClean="0"/>
-              <a:t>10/04/2018</a:t>
+              <a:t>14/04/2018</a:t>
             </a:fld>
             <a:endParaRPr lang="it-IT"/>
           </a:p>
@@ -2093,7 +2099,7 @@
           <a:p>
             <a:fld id="{081E6A33-EDA1-4F1D-B7F2-06C3686F4363}" type="datetimeFigureOut">
               <a:rPr lang="it-IT" smtClean="0"/>
-              <a:t>10/04/2018</a:t>
+              <a:t>14/04/2018</a:t>
             </a:fld>
             <a:endParaRPr lang="it-IT"/>
           </a:p>
@@ -2346,7 +2352,7 @@
           <a:p>
             <a:fld id="{081E6A33-EDA1-4F1D-B7F2-06C3686F4363}" type="datetimeFigureOut">
               <a:rPr lang="it-IT" smtClean="0"/>
-              <a:t>10/04/2018</a:t>
+              <a:t>14/04/2018</a:t>
             </a:fld>
             <a:endParaRPr lang="it-IT"/>
           </a:p>
@@ -2559,7 +2565,7 @@
           <a:p>
             <a:fld id="{081E6A33-EDA1-4F1D-B7F2-06C3686F4363}" type="datetimeFigureOut">
               <a:rPr lang="it-IT" smtClean="0"/>
-              <a:t>10/04/2018</a:t>
+              <a:t>14/04/2018</a:t>
             </a:fld>
             <a:endParaRPr lang="it-IT"/>
           </a:p>
@@ -3439,6 +3445,966 @@
   <p:clrMapOvr>
     <a:masterClrMapping/>
   </p:clrMapOvr>
+  <p:timing>
+    <p:tnLst>
+      <p:par>
+        <p:cTn id="1" dur="indefinite" restart="never" nodeType="tmRoot"/>
+      </p:par>
+    </p:tnLst>
+  </p:timing>
+</p:sld>
+</file>
+
+<file path=ppt/slides/slide2.xml><?xml version="1.0" encoding="utf-8"?>
+<p:sld xmlns:a="http://schemas.openxmlformats.org/drawingml/2006/main" xmlns:r="http://schemas.openxmlformats.org/officeDocument/2006/relationships" xmlns:p="http://schemas.openxmlformats.org/presentationml/2006/main">
+  <p:cSld>
+    <p:spTree>
+      <p:nvGrpSpPr>
+        <p:cNvPr id="1" name=""/>
+        <p:cNvGrpSpPr/>
+        <p:nvPr/>
+      </p:nvGrpSpPr>
+      <p:grpSpPr>
+        <a:xfrm>
+          <a:off x="0" y="0"/>
+          <a:ext cx="0" cy="0"/>
+          <a:chOff x="0" y="0"/>
+          <a:chExt cx="0" cy="0"/>
+        </a:xfrm>
+      </p:grpSpPr>
+      <p:pic>
+        <p:nvPicPr>
+          <p:cNvPr id="2" name="Immagine 1"/>
+          <p:cNvPicPr>
+            <a:picLocks noChangeAspect="1"/>
+          </p:cNvPicPr>
+          <p:nvPr/>
+        </p:nvPicPr>
+        <p:blipFill>
+          <a:blip r:embed="rId2" cstate="print">
+            <a:extLst>
+              <a:ext uri="{28A0092B-C50C-407E-A947-70E740481C1C}">
+                <a14:useLocalDpi xmlns:a14="http://schemas.microsoft.com/office/drawing/2010/main" val="0"/>
+              </a:ext>
+            </a:extLst>
+          </a:blip>
+          <a:stretch>
+            <a:fillRect/>
+          </a:stretch>
+        </p:blipFill>
+        <p:spPr>
+          <a:xfrm>
+            <a:off x="5682223" y="0"/>
+            <a:ext cx="1623732" cy="2886635"/>
+          </a:xfrm>
+          <a:prstGeom prst="rect">
+            <a:avLst/>
+          </a:prstGeom>
+        </p:spPr>
+      </p:pic>
+      <p:sp>
+        <p:nvSpPr>
+          <p:cNvPr id="3" name="CasellaDiTesto 2"/>
+          <p:cNvSpPr txBox="1"/>
+          <p:nvPr/>
+        </p:nvSpPr>
+        <p:spPr>
+          <a:xfrm>
+            <a:off x="5682223" y="2435731"/>
+            <a:ext cx="1945341" cy="369332"/>
+          </a:xfrm>
+          <a:prstGeom prst="rect">
+            <a:avLst/>
+          </a:prstGeom>
+          <a:noFill/>
+          <a:ln>
+            <a:noFill/>
+          </a:ln>
+        </p:spPr>
+        <p:txBody>
+          <a:bodyPr wrap="square" rtlCol="0">
+            <a:spAutoFit/>
+          </a:bodyPr>
+          <a:lstStyle/>
+          <a:p>
+            <a:r>
+              <a:rPr lang="it-IT" b="1" dirty="0" err="1" smtClean="0">
+                <a:ln w="0"/>
+                <a:solidFill>
+                  <a:srgbClr val="FF0000"/>
+                </a:solidFill>
+                <a:effectLst>
+                  <a:outerShdw blurRad="38100" dist="19050" dir="2700000" algn="tl" rotWithShape="0">
+                    <a:schemeClr val="dk1">
+                      <a:alpha val="40000"/>
+                    </a:schemeClr>
+                  </a:outerShdw>
+                </a:effectLst>
+              </a:rPr>
+              <a:t>MainActivity</a:t>
+            </a:r>
+            <a:endParaRPr lang="it-IT" b="1" dirty="0">
+              <a:ln w="0"/>
+              <a:solidFill>
+                <a:srgbClr val="FF0000"/>
+              </a:solidFill>
+              <a:effectLst>
+                <a:outerShdw blurRad="38100" dist="19050" dir="2700000" algn="tl" rotWithShape="0">
+                  <a:schemeClr val="dk1">
+                    <a:alpha val="40000"/>
+                  </a:schemeClr>
+                </a:outerShdw>
+              </a:effectLst>
+            </a:endParaRPr>
+          </a:p>
+        </p:txBody>
+      </p:sp>
+      <p:pic>
+        <p:nvPicPr>
+          <p:cNvPr id="4" name="Immagine 3"/>
+          <p:cNvPicPr>
+            <a:picLocks noChangeAspect="1"/>
+          </p:cNvPicPr>
+          <p:nvPr/>
+        </p:nvPicPr>
+        <p:blipFill>
+          <a:blip r:embed="rId3" cstate="print">
+            <a:extLst>
+              <a:ext uri="{28A0092B-C50C-407E-A947-70E740481C1C}">
+                <a14:useLocalDpi xmlns:a14="http://schemas.microsoft.com/office/drawing/2010/main" val="0"/>
+              </a:ext>
+            </a:extLst>
+          </a:blip>
+          <a:stretch>
+            <a:fillRect/>
+          </a:stretch>
+        </p:blipFill>
+        <p:spPr>
+          <a:xfrm>
+            <a:off x="3730401" y="3382439"/>
+            <a:ext cx="1623732" cy="2886635"/>
+          </a:xfrm>
+          <a:prstGeom prst="rect">
+            <a:avLst/>
+          </a:prstGeom>
+        </p:spPr>
+      </p:pic>
+      <p:pic>
+        <p:nvPicPr>
+          <p:cNvPr id="8" name="Immagine 7"/>
+          <p:cNvPicPr>
+            <a:picLocks noChangeAspect="1"/>
+          </p:cNvPicPr>
+          <p:nvPr/>
+        </p:nvPicPr>
+        <p:blipFill>
+          <a:blip r:embed="rId4" cstate="print">
+            <a:extLst>
+              <a:ext uri="{28A0092B-C50C-407E-A947-70E740481C1C}">
+                <a14:useLocalDpi xmlns:a14="http://schemas.microsoft.com/office/drawing/2010/main" val="0"/>
+              </a:ext>
+            </a:extLst>
+          </a:blip>
+          <a:stretch>
+            <a:fillRect/>
+          </a:stretch>
+        </p:blipFill>
+        <p:spPr>
+          <a:xfrm>
+            <a:off x="3623142" y="0"/>
+            <a:ext cx="1621351" cy="2882402"/>
+          </a:xfrm>
+          <a:prstGeom prst="rect">
+            <a:avLst/>
+          </a:prstGeom>
+        </p:spPr>
+      </p:pic>
+      <p:cxnSp>
+        <p:nvCxnSpPr>
+          <p:cNvPr id="9" name="Connettore 2 8"/>
+          <p:cNvCxnSpPr/>
+          <p:nvPr/>
+        </p:nvCxnSpPr>
+        <p:spPr>
+          <a:xfrm flipH="1">
+            <a:off x="4844093" y="2026025"/>
+            <a:ext cx="1110992" cy="0"/>
+          </a:xfrm>
+          <a:prstGeom prst="straightConnector1">
+            <a:avLst/>
+          </a:prstGeom>
+          <a:ln w="76200">
+            <a:tailEnd type="triangle"/>
+          </a:ln>
+        </p:spPr>
+        <p:style>
+          <a:lnRef idx="3">
+            <a:schemeClr val="accent2"/>
+          </a:lnRef>
+          <a:fillRef idx="0">
+            <a:schemeClr val="accent2"/>
+          </a:fillRef>
+          <a:effectRef idx="2">
+            <a:schemeClr val="accent2"/>
+          </a:effectRef>
+          <a:fontRef idx="minor">
+            <a:schemeClr val="tx1"/>
+          </a:fontRef>
+        </p:style>
+      </p:cxnSp>
+      <p:sp>
+        <p:nvSpPr>
+          <p:cNvPr id="11" name="CasellaDiTesto 10"/>
+          <p:cNvSpPr txBox="1"/>
+          <p:nvPr/>
+        </p:nvSpPr>
+        <p:spPr>
+          <a:xfrm>
+            <a:off x="5085020" y="1692551"/>
+            <a:ext cx="839742" cy="369332"/>
+          </a:xfrm>
+          <a:prstGeom prst="rect">
+            <a:avLst/>
+          </a:prstGeom>
+          <a:noFill/>
+          <a:ln>
+            <a:noFill/>
+          </a:ln>
+        </p:spPr>
+        <p:txBody>
+          <a:bodyPr wrap="square" rtlCol="0">
+            <a:spAutoFit/>
+          </a:bodyPr>
+          <a:lstStyle/>
+          <a:p>
+            <a:r>
+              <a:rPr lang="it-IT" b="1" dirty="0" err="1" smtClean="0">
+                <a:ln w="0"/>
+                <a:solidFill>
+                  <a:srgbClr val="FF0000"/>
+                </a:solidFill>
+                <a:effectLst>
+                  <a:outerShdw blurRad="38100" dist="19050" dir="2700000" algn="tl" rotWithShape="0">
+                    <a:schemeClr val="dk1">
+                      <a:alpha val="40000"/>
+                    </a:schemeClr>
+                  </a:outerShdw>
+                </a:effectLst>
+              </a:rPr>
+              <a:t>Swipe</a:t>
+            </a:r>
+            <a:endParaRPr lang="it-IT" b="1" dirty="0">
+              <a:ln w="0"/>
+              <a:solidFill>
+                <a:srgbClr val="FF0000"/>
+              </a:solidFill>
+              <a:effectLst>
+                <a:outerShdw blurRad="38100" dist="19050" dir="2700000" algn="tl" rotWithShape="0">
+                  <a:schemeClr val="dk1">
+                    <a:alpha val="40000"/>
+                  </a:schemeClr>
+                </a:outerShdw>
+              </a:effectLst>
+            </a:endParaRPr>
+          </a:p>
+        </p:txBody>
+      </p:sp>
+      <p:sp>
+        <p:nvSpPr>
+          <p:cNvPr id="12" name="CasellaDiTesto 11"/>
+          <p:cNvSpPr txBox="1"/>
+          <p:nvPr/>
+        </p:nvSpPr>
+        <p:spPr>
+          <a:xfrm>
+            <a:off x="3648216" y="2495782"/>
+            <a:ext cx="1945341" cy="369332"/>
+          </a:xfrm>
+          <a:prstGeom prst="rect">
+            <a:avLst/>
+          </a:prstGeom>
+          <a:noFill/>
+          <a:ln>
+            <a:noFill/>
+          </a:ln>
+        </p:spPr>
+        <p:txBody>
+          <a:bodyPr wrap="square" rtlCol="0">
+            <a:spAutoFit/>
+          </a:bodyPr>
+          <a:lstStyle/>
+          <a:p>
+            <a:r>
+              <a:rPr lang="it-IT" b="1" dirty="0" smtClean="0">
+                <a:ln w="0"/>
+                <a:solidFill>
+                  <a:srgbClr val="FF0000"/>
+                </a:solidFill>
+                <a:effectLst>
+                  <a:outerShdw blurRad="38100" dist="19050" dir="2700000" algn="tl" rotWithShape="0">
+                    <a:schemeClr val="dk1">
+                      <a:alpha val="40000"/>
+                    </a:schemeClr>
+                  </a:outerShdw>
+                </a:effectLst>
+              </a:rPr>
+              <a:t>Menu</a:t>
+            </a:r>
+            <a:endParaRPr lang="it-IT" b="1" dirty="0">
+              <a:ln w="0"/>
+              <a:solidFill>
+                <a:srgbClr val="FF0000"/>
+              </a:solidFill>
+              <a:effectLst>
+                <a:outerShdw blurRad="38100" dist="19050" dir="2700000" algn="tl" rotWithShape="0">
+                  <a:schemeClr val="dk1">
+                    <a:alpha val="40000"/>
+                  </a:schemeClr>
+                </a:outerShdw>
+              </a:effectLst>
+            </a:endParaRPr>
+          </a:p>
+        </p:txBody>
+      </p:sp>
+      <p:pic>
+        <p:nvPicPr>
+          <p:cNvPr id="13" name="Immagine 12"/>
+          <p:cNvPicPr>
+            <a:picLocks noChangeAspect="1"/>
+          </p:cNvPicPr>
+          <p:nvPr/>
+        </p:nvPicPr>
+        <p:blipFill>
+          <a:blip r:embed="rId5" cstate="print">
+            <a:extLst>
+              <a:ext uri="{28A0092B-C50C-407E-A947-70E740481C1C}">
+                <a14:useLocalDpi xmlns:a14="http://schemas.microsoft.com/office/drawing/2010/main" val="0"/>
+              </a:ext>
+            </a:extLst>
+          </a:blip>
+          <a:stretch>
+            <a:fillRect/>
+          </a:stretch>
+        </p:blipFill>
+        <p:spPr>
+          <a:xfrm>
+            <a:off x="1625272" y="0"/>
+            <a:ext cx="1621351" cy="2882402"/>
+          </a:xfrm>
+          <a:prstGeom prst="rect">
+            <a:avLst/>
+          </a:prstGeom>
+        </p:spPr>
+      </p:pic>
+      <p:cxnSp>
+        <p:nvCxnSpPr>
+          <p:cNvPr id="14" name="Connettore 2 13"/>
+          <p:cNvCxnSpPr/>
+          <p:nvPr/>
+        </p:nvCxnSpPr>
+        <p:spPr>
+          <a:xfrm flipH="1">
+            <a:off x="3174905" y="1084730"/>
+            <a:ext cx="555496" cy="0"/>
+          </a:xfrm>
+          <a:prstGeom prst="straightConnector1">
+            <a:avLst/>
+          </a:prstGeom>
+          <a:ln w="76200">
+            <a:tailEnd type="triangle"/>
+          </a:ln>
+        </p:spPr>
+        <p:style>
+          <a:lnRef idx="3">
+            <a:schemeClr val="accent2"/>
+          </a:lnRef>
+          <a:fillRef idx="0">
+            <a:schemeClr val="accent2"/>
+          </a:fillRef>
+          <a:effectRef idx="2">
+            <a:schemeClr val="accent2"/>
+          </a:effectRef>
+          <a:fontRef idx="minor">
+            <a:schemeClr val="tx1"/>
+          </a:fontRef>
+        </p:style>
+      </p:cxnSp>
+      <p:sp>
+        <p:nvSpPr>
+          <p:cNvPr id="16" name="CasellaDiTesto 15"/>
+          <p:cNvSpPr txBox="1"/>
+          <p:nvPr/>
+        </p:nvSpPr>
+        <p:spPr>
+          <a:xfrm>
+            <a:off x="3534267" y="4948801"/>
+            <a:ext cx="2390495" cy="369332"/>
+          </a:xfrm>
+          <a:prstGeom prst="rect">
+            <a:avLst/>
+          </a:prstGeom>
+          <a:noFill/>
+          <a:ln>
+            <a:noFill/>
+          </a:ln>
+        </p:spPr>
+        <p:txBody>
+          <a:bodyPr wrap="square" rtlCol="0">
+            <a:spAutoFit/>
+          </a:bodyPr>
+          <a:lstStyle/>
+          <a:p>
+            <a:r>
+              <a:rPr lang="it-IT" b="1" dirty="0" err="1" smtClean="0">
+                <a:ln w="0"/>
+                <a:solidFill>
+                  <a:srgbClr val="FF0000"/>
+                </a:solidFill>
+                <a:effectLst>
+                  <a:outerShdw blurRad="38100" dist="19050" dir="2700000" algn="tl" rotWithShape="0">
+                    <a:schemeClr val="dk1">
+                      <a:alpha val="40000"/>
+                    </a:schemeClr>
+                  </a:outerShdw>
+                </a:effectLst>
+              </a:rPr>
+              <a:t>SelezionaMedicina</a:t>
+            </a:r>
+            <a:endParaRPr lang="it-IT" b="1" dirty="0">
+              <a:ln w="0"/>
+              <a:solidFill>
+                <a:srgbClr val="FF0000"/>
+              </a:solidFill>
+              <a:effectLst>
+                <a:outerShdw blurRad="38100" dist="19050" dir="2700000" algn="tl" rotWithShape="0">
+                  <a:schemeClr val="dk1">
+                    <a:alpha val="40000"/>
+                  </a:schemeClr>
+                </a:outerShdw>
+              </a:effectLst>
+            </a:endParaRPr>
+          </a:p>
+        </p:txBody>
+      </p:sp>
+      <p:sp>
+        <p:nvSpPr>
+          <p:cNvPr id="40" name="Figura a mano libera 39"/>
+          <p:cNvSpPr/>
+          <p:nvPr/>
+        </p:nvSpPr>
+        <p:spPr>
+          <a:xfrm>
+            <a:off x="959224" y="546847"/>
+            <a:ext cx="627529" cy="3164541"/>
+          </a:xfrm>
+          <a:custGeom>
+            <a:avLst/>
+            <a:gdLst>
+              <a:gd name="connsiteX0" fmla="*/ 627529 w 627529"/>
+              <a:gd name="connsiteY0" fmla="*/ 0 h 4329953"/>
+              <a:gd name="connsiteX1" fmla="*/ 0 w 627529"/>
+              <a:gd name="connsiteY1" fmla="*/ 3567953 h 4329953"/>
+              <a:gd name="connsiteX2" fmla="*/ 627529 w 627529"/>
+              <a:gd name="connsiteY2" fmla="*/ 4329953 h 4329953"/>
+            </a:gdLst>
+            <a:ahLst/>
+            <a:cxnLst>
+              <a:cxn ang="0">
+                <a:pos x="connsiteX0" y="connsiteY0"/>
+              </a:cxn>
+              <a:cxn ang="0">
+                <a:pos x="connsiteX1" y="connsiteY1"/>
+              </a:cxn>
+              <a:cxn ang="0">
+                <a:pos x="connsiteX2" y="connsiteY2"/>
+              </a:cxn>
+            </a:cxnLst>
+            <a:rect l="l" t="t" r="r" b="b"/>
+            <a:pathLst>
+              <a:path w="627529" h="4329953">
+                <a:moveTo>
+                  <a:pt x="627529" y="0"/>
+                </a:moveTo>
+                <a:cubicBezTo>
+                  <a:pt x="313764" y="1423147"/>
+                  <a:pt x="0" y="2846294"/>
+                  <a:pt x="0" y="3567953"/>
+                </a:cubicBezTo>
+                <a:cubicBezTo>
+                  <a:pt x="0" y="4289612"/>
+                  <a:pt x="313764" y="4309782"/>
+                  <a:pt x="627529" y="4329953"/>
+                </a:cubicBezTo>
+              </a:path>
+            </a:pathLst>
+          </a:custGeom>
+          <a:ln w="76200">
+            <a:headEnd type="none" w="med" len="med"/>
+            <a:tailEnd type="arrow" w="med" len="med"/>
+          </a:ln>
+        </p:spPr>
+        <p:style>
+          <a:lnRef idx="1">
+            <a:schemeClr val="accent2"/>
+          </a:lnRef>
+          <a:fillRef idx="0">
+            <a:schemeClr val="accent2"/>
+          </a:fillRef>
+          <a:effectRef idx="0">
+            <a:schemeClr val="accent2"/>
+          </a:effectRef>
+          <a:fontRef idx="minor">
+            <a:schemeClr val="tx1"/>
+          </a:fontRef>
+        </p:style>
+        <p:txBody>
+          <a:bodyPr rtlCol="0" anchor="ctr"/>
+          <a:lstStyle/>
+          <a:p>
+            <a:pPr algn="ctr"/>
+            <a:endParaRPr lang="it-IT"/>
+          </a:p>
+        </p:txBody>
+      </p:sp>
+      <p:cxnSp>
+        <p:nvCxnSpPr>
+          <p:cNvPr id="42" name="Connettore 4 41"/>
+          <p:cNvCxnSpPr>
+            <a:stCxn id="2" idx="2"/>
+            <a:endCxn id="52" idx="0"/>
+          </p:cNvCxnSpPr>
+          <p:nvPr/>
+        </p:nvCxnSpPr>
+        <p:spPr>
+          <a:xfrm rot="5400000">
+            <a:off x="4216521" y="1104871"/>
+            <a:ext cx="495805" cy="4059332"/>
+          </a:xfrm>
+          <a:prstGeom prst="bentConnector3">
+            <a:avLst>
+              <a:gd name="adj1" fmla="val 50000"/>
+            </a:avLst>
+          </a:prstGeom>
+          <a:ln w="76200">
+            <a:tailEnd type="triangle"/>
+          </a:ln>
+        </p:spPr>
+        <p:style>
+          <a:lnRef idx="1">
+            <a:schemeClr val="accent2"/>
+          </a:lnRef>
+          <a:fillRef idx="0">
+            <a:schemeClr val="accent2"/>
+          </a:fillRef>
+          <a:effectRef idx="0">
+            <a:schemeClr val="accent2"/>
+          </a:effectRef>
+          <a:fontRef idx="minor">
+            <a:schemeClr val="tx1"/>
+          </a:fontRef>
+        </p:style>
+      </p:cxnSp>
+      <p:pic>
+        <p:nvPicPr>
+          <p:cNvPr id="52" name="Immagine 51"/>
+          <p:cNvPicPr>
+            <a:picLocks noChangeAspect="1"/>
+          </p:cNvPicPr>
+          <p:nvPr/>
+        </p:nvPicPr>
+        <p:blipFill>
+          <a:blip r:embed="rId6" cstate="print">
+            <a:extLst>
+              <a:ext uri="{28A0092B-C50C-407E-A947-70E740481C1C}">
+                <a14:useLocalDpi xmlns:a14="http://schemas.microsoft.com/office/drawing/2010/main" val="0"/>
+              </a:ext>
+            </a:extLst>
+          </a:blip>
+          <a:stretch>
+            <a:fillRect/>
+          </a:stretch>
+        </p:blipFill>
+        <p:spPr>
+          <a:xfrm>
+            <a:off x="1622891" y="3382440"/>
+            <a:ext cx="1623732" cy="2886635"/>
+          </a:xfrm>
+          <a:prstGeom prst="rect">
+            <a:avLst/>
+          </a:prstGeom>
+        </p:spPr>
+      </p:pic>
+      <p:cxnSp>
+        <p:nvCxnSpPr>
+          <p:cNvPr id="53" name="Connettore 2 52"/>
+          <p:cNvCxnSpPr/>
+          <p:nvPr/>
+        </p:nvCxnSpPr>
+        <p:spPr>
+          <a:xfrm>
+            <a:off x="2823198" y="3864549"/>
+            <a:ext cx="919125" cy="8965"/>
+          </a:xfrm>
+          <a:prstGeom prst="straightConnector1">
+            <a:avLst/>
+          </a:prstGeom>
+          <a:ln w="76200">
+            <a:tailEnd type="triangle"/>
+          </a:ln>
+        </p:spPr>
+        <p:style>
+          <a:lnRef idx="3">
+            <a:schemeClr val="accent2"/>
+          </a:lnRef>
+          <a:fillRef idx="0">
+            <a:schemeClr val="accent2"/>
+          </a:fillRef>
+          <a:effectRef idx="2">
+            <a:schemeClr val="accent2"/>
+          </a:effectRef>
+          <a:fontRef idx="minor">
+            <a:schemeClr val="tx1"/>
+          </a:fontRef>
+        </p:style>
+      </p:cxnSp>
+      <p:sp>
+        <p:nvSpPr>
+          <p:cNvPr id="56" name="CasellaDiTesto 55"/>
+          <p:cNvSpPr txBox="1"/>
+          <p:nvPr/>
+        </p:nvSpPr>
+        <p:spPr>
+          <a:xfrm>
+            <a:off x="1785868" y="2463516"/>
+            <a:ext cx="1945341" cy="369332"/>
+          </a:xfrm>
+          <a:prstGeom prst="rect">
+            <a:avLst/>
+          </a:prstGeom>
+          <a:noFill/>
+          <a:ln>
+            <a:noFill/>
+          </a:ln>
+        </p:spPr>
+        <p:txBody>
+          <a:bodyPr wrap="square" rtlCol="0">
+            <a:spAutoFit/>
+          </a:bodyPr>
+          <a:lstStyle/>
+          <a:p>
+            <a:r>
+              <a:rPr lang="it-IT" b="1" dirty="0" err="1" smtClean="0">
+                <a:ln w="0"/>
+                <a:solidFill>
+                  <a:srgbClr val="FF0000"/>
+                </a:solidFill>
+                <a:effectLst>
+                  <a:outerShdw blurRad="38100" dist="19050" dir="2700000" algn="tl" rotWithShape="0">
+                    <a:schemeClr val="dk1">
+                      <a:alpha val="40000"/>
+                    </a:schemeClr>
+                  </a:outerShdw>
+                </a:effectLst>
+              </a:rPr>
+              <a:t>TerapiaActivity</a:t>
+            </a:r>
+            <a:endParaRPr lang="it-IT" b="1" dirty="0">
+              <a:ln w="0"/>
+              <a:solidFill>
+                <a:srgbClr val="FF0000"/>
+              </a:solidFill>
+              <a:effectLst>
+                <a:outerShdw blurRad="38100" dist="19050" dir="2700000" algn="tl" rotWithShape="0">
+                  <a:schemeClr val="dk1">
+                    <a:alpha val="40000"/>
+                  </a:schemeClr>
+                </a:outerShdw>
+              </a:effectLst>
+            </a:endParaRPr>
+          </a:p>
+        </p:txBody>
+      </p:sp>
+      <p:sp>
+        <p:nvSpPr>
+          <p:cNvPr id="57" name="CasellaDiTesto 56"/>
+          <p:cNvSpPr txBox="1"/>
+          <p:nvPr/>
+        </p:nvSpPr>
+        <p:spPr>
+          <a:xfrm>
+            <a:off x="1563290" y="4720841"/>
+            <a:ext cx="2390495" cy="369332"/>
+          </a:xfrm>
+          <a:prstGeom prst="rect">
+            <a:avLst/>
+          </a:prstGeom>
+          <a:noFill/>
+          <a:ln>
+            <a:noFill/>
+          </a:ln>
+        </p:spPr>
+        <p:txBody>
+          <a:bodyPr wrap="square" rtlCol="0">
+            <a:spAutoFit/>
+          </a:bodyPr>
+          <a:lstStyle/>
+          <a:p>
+            <a:r>
+              <a:rPr lang="it-IT" b="1" dirty="0" err="1" smtClean="0">
+                <a:ln w="0"/>
+                <a:solidFill>
+                  <a:srgbClr val="FF0000"/>
+                </a:solidFill>
+                <a:effectLst>
+                  <a:outerShdw blurRad="38100" dist="19050" dir="2700000" algn="tl" rotWithShape="0">
+                    <a:schemeClr val="dk1">
+                      <a:alpha val="40000"/>
+                    </a:schemeClr>
+                  </a:outerShdw>
+                </a:effectLst>
+              </a:rPr>
+              <a:t>NuovaAssunzione</a:t>
+            </a:r>
+            <a:endParaRPr lang="it-IT" b="1" dirty="0">
+              <a:ln w="0"/>
+              <a:solidFill>
+                <a:srgbClr val="FF0000"/>
+              </a:solidFill>
+              <a:effectLst>
+                <a:outerShdw blurRad="38100" dist="19050" dir="2700000" algn="tl" rotWithShape="0">
+                  <a:schemeClr val="dk1">
+                    <a:alpha val="40000"/>
+                  </a:schemeClr>
+                </a:outerShdw>
+              </a:effectLst>
+            </a:endParaRPr>
+          </a:p>
+        </p:txBody>
+      </p:sp>
+      <p:pic>
+        <p:nvPicPr>
+          <p:cNvPr id="61" name="Immagine 60"/>
+          <p:cNvPicPr>
+            <a:picLocks noChangeAspect="1"/>
+          </p:cNvPicPr>
+          <p:nvPr/>
+        </p:nvPicPr>
+        <p:blipFill>
+          <a:blip r:embed="rId7" cstate="print">
+            <a:extLst>
+              <a:ext uri="{28A0092B-C50C-407E-A947-70E740481C1C}">
+                <a14:useLocalDpi xmlns:a14="http://schemas.microsoft.com/office/drawing/2010/main" val="0"/>
+              </a:ext>
+            </a:extLst>
+          </a:blip>
+          <a:stretch>
+            <a:fillRect/>
+          </a:stretch>
+        </p:blipFill>
+        <p:spPr>
+          <a:xfrm>
+            <a:off x="9239879" y="0"/>
+            <a:ext cx="1621351" cy="2882402"/>
+          </a:xfrm>
+          <a:prstGeom prst="rect">
+            <a:avLst/>
+          </a:prstGeom>
+        </p:spPr>
+      </p:pic>
+      <p:sp>
+        <p:nvSpPr>
+          <p:cNvPr id="62" name="CasellaDiTesto 61"/>
+          <p:cNvSpPr txBox="1"/>
+          <p:nvPr/>
+        </p:nvSpPr>
+        <p:spPr>
+          <a:xfrm>
+            <a:off x="9400682" y="2337775"/>
+            <a:ext cx="1945341" cy="369332"/>
+          </a:xfrm>
+          <a:prstGeom prst="rect">
+            <a:avLst/>
+          </a:prstGeom>
+          <a:noFill/>
+          <a:ln>
+            <a:noFill/>
+          </a:ln>
+        </p:spPr>
+        <p:txBody>
+          <a:bodyPr wrap="square" rtlCol="0">
+            <a:spAutoFit/>
+          </a:bodyPr>
+          <a:lstStyle/>
+          <a:p>
+            <a:r>
+              <a:rPr lang="it-IT" b="1" dirty="0" smtClean="0">
+                <a:ln w="0"/>
+                <a:solidFill>
+                  <a:srgbClr val="FF0000"/>
+                </a:solidFill>
+                <a:effectLst>
+                  <a:outerShdw blurRad="38100" dist="19050" dir="2700000" algn="tl" rotWithShape="0">
+                    <a:schemeClr val="dk1">
+                      <a:alpha val="40000"/>
+                    </a:schemeClr>
+                  </a:outerShdw>
+                </a:effectLst>
+              </a:rPr>
+              <a:t>Notifiche</a:t>
+            </a:r>
+            <a:endParaRPr lang="it-IT" b="1" dirty="0">
+              <a:ln w="0"/>
+              <a:solidFill>
+                <a:srgbClr val="FF0000"/>
+              </a:solidFill>
+              <a:effectLst>
+                <a:outerShdw blurRad="38100" dist="19050" dir="2700000" algn="tl" rotWithShape="0">
+                  <a:schemeClr val="dk1">
+                    <a:alpha val="40000"/>
+                  </a:schemeClr>
+                </a:outerShdw>
+              </a:effectLst>
+            </a:endParaRPr>
+          </a:p>
+        </p:txBody>
+      </p:sp>
+      <p:sp>
+        <p:nvSpPr>
+          <p:cNvPr id="63" name="CasellaDiTesto 62"/>
+          <p:cNvSpPr txBox="1"/>
+          <p:nvPr/>
+        </p:nvSpPr>
+        <p:spPr>
+          <a:xfrm>
+            <a:off x="1468177" y="6269074"/>
+            <a:ext cx="5407752" cy="646331"/>
+          </a:xfrm>
+          <a:prstGeom prst="rect">
+            <a:avLst/>
+          </a:prstGeom>
+          <a:noFill/>
+          <a:ln>
+            <a:noFill/>
+          </a:ln>
+        </p:spPr>
+        <p:txBody>
+          <a:bodyPr wrap="square" rtlCol="0">
+            <a:spAutoFit/>
+          </a:bodyPr>
+          <a:lstStyle/>
+          <a:p>
+            <a:r>
+              <a:rPr lang="it-IT" b="1" dirty="0" smtClean="0">
+                <a:ln w="0"/>
+                <a:solidFill>
+                  <a:srgbClr val="FF0000"/>
+                </a:solidFill>
+                <a:effectLst>
+                  <a:outerShdw blurRad="38100" dist="19050" dir="2700000" algn="tl" rotWithShape="0">
+                    <a:schemeClr val="dk1">
+                      <a:alpha val="40000"/>
+                    </a:schemeClr>
+                  </a:outerShdw>
+                </a:effectLst>
+              </a:rPr>
+              <a:t>Guardare immagini in /File Report/</a:t>
+            </a:r>
+            <a:r>
+              <a:rPr lang="it-IT" b="1" dirty="0" err="1" smtClean="0">
+                <a:ln w="0"/>
+                <a:solidFill>
+                  <a:srgbClr val="FF0000"/>
+                </a:solidFill>
+                <a:effectLst>
+                  <a:outerShdw blurRad="38100" dist="19050" dir="2700000" algn="tl" rotWithShape="0">
+                    <a:schemeClr val="dk1">
+                      <a:alpha val="40000"/>
+                    </a:schemeClr>
+                  </a:outerShdw>
+                </a:effectLst>
+              </a:rPr>
+              <a:t>App</a:t>
+            </a:r>
+            <a:r>
+              <a:rPr lang="it-IT" b="1" dirty="0" smtClean="0">
+                <a:ln w="0"/>
+                <a:solidFill>
+                  <a:srgbClr val="FF0000"/>
+                </a:solidFill>
+                <a:effectLst>
+                  <a:outerShdw blurRad="38100" dist="19050" dir="2700000" algn="tl" rotWithShape="0">
+                    <a:schemeClr val="dk1">
+                      <a:alpha val="40000"/>
+                    </a:schemeClr>
+                  </a:outerShdw>
+                </a:effectLst>
+              </a:rPr>
+              <a:t> simili</a:t>
+            </a:r>
+            <a:br>
+              <a:rPr lang="it-IT" b="1" dirty="0" smtClean="0">
+                <a:ln w="0"/>
+                <a:solidFill>
+                  <a:srgbClr val="FF0000"/>
+                </a:solidFill>
+                <a:effectLst>
+                  <a:outerShdw blurRad="38100" dist="19050" dir="2700000" algn="tl" rotWithShape="0">
+                    <a:schemeClr val="dk1">
+                      <a:alpha val="40000"/>
+                    </a:schemeClr>
+                  </a:outerShdw>
+                </a:effectLst>
+              </a:rPr>
+            </a:br>
+            <a:r>
+              <a:rPr lang="it-IT" b="1" dirty="0" smtClean="0">
+                <a:ln w="0"/>
+                <a:solidFill>
+                  <a:srgbClr val="FF0000"/>
+                </a:solidFill>
+                <a:effectLst>
+                  <a:outerShdw blurRad="38100" dist="19050" dir="2700000" algn="tl" rotWithShape="0">
+                    <a:schemeClr val="dk1">
+                      <a:alpha val="40000"/>
+                    </a:schemeClr>
+                  </a:outerShdw>
+                </a:effectLst>
+              </a:rPr>
+              <a:t>per le varie opzioni (frequenza, notifiche, dose …)</a:t>
+            </a:r>
+            <a:endParaRPr lang="it-IT" b="1" dirty="0">
+              <a:ln w="0"/>
+              <a:solidFill>
+                <a:srgbClr val="FF0000"/>
+              </a:solidFill>
+              <a:effectLst>
+                <a:outerShdw blurRad="38100" dist="19050" dir="2700000" algn="tl" rotWithShape="0">
+                  <a:schemeClr val="dk1">
+                    <a:alpha val="40000"/>
+                  </a:schemeClr>
+                </a:outerShdw>
+              </a:effectLst>
+            </a:endParaRPr>
+          </a:p>
+        </p:txBody>
+      </p:sp>
+    </p:spTree>
+    <p:extLst>
+      <p:ext uri="{BB962C8B-B14F-4D97-AF65-F5344CB8AC3E}">
+        <p14:creationId xmlns:p14="http://schemas.microsoft.com/office/powerpoint/2010/main" val="2399034714"/>
+      </p:ext>
+    </p:extLst>
+  </p:cSld>
+  <p:clrMapOvr>
+    <a:masterClrMapping/>
+  </p:clrMapOvr>
+  <p:timing>
+    <p:tnLst>
+      <p:par>
+        <p:cTn id="1" dur="indefinite" restart="never" nodeType="tmRoot"/>
+      </p:par>
+    </p:tnLst>
+  </p:timing>
 </p:sld>
 </file>
 

</xml_diff>